<commit_message>
Camel case naming for examples and exercises.
</commit_message>
<xml_diff>
--- a/01. Java SE/Slides/01. Java.pptx
+++ b/01. Java SE/Slides/01. Java.pptx
@@ -223,7 +223,7 @@
           <a:p>
             <a:fld id="{59041DB8-B66F-4DC8-A96E-33677E0F90FF}" type="datetimeFigureOut">
               <a:rPr lang="en-US" smtClean="0"/>
-              <a:t>3/9/2015</a:t>
+              <a:t>3/10/2015</a:t>
             </a:fld>
             <a:endParaRPr lang="en-US"/>
           </a:p>
@@ -388,7 +388,7 @@
           <a:p>
             <a:fld id="{DEB49C4A-65AC-492D-9701-81B46C3AD0E4}" type="datetimeFigureOut">
               <a:rPr lang="en-US" smtClean="0"/>
-              <a:t>3/9/2015</a:t>
+              <a:t>3/10/2015</a:t>
             </a:fld>
             <a:endParaRPr lang="en-US"/>
           </a:p>
@@ -4994,7 +4994,7 @@
           <a:p>
             <a:fld id="{384A29A4-78C8-47AB-BA06-22CB45938951}" type="datetime1">
               <a:rPr lang="en-US" smtClean="0"/>
-              <a:t>3/9/2015</a:t>
+              <a:t>3/10/2015</a:t>
             </a:fld>
             <a:endParaRPr lang="en-US"/>
           </a:p>
@@ -5189,7 +5189,7 @@
           <a:p>
             <a:fld id="{E1ED4ACF-2D82-46F2-A8E9-23963AA34E86}" type="datetime1">
               <a:rPr lang="en-US" smtClean="0"/>
-              <a:t>3/9/2015</a:t>
+              <a:t>3/10/2015</a:t>
             </a:fld>
             <a:endParaRPr lang="en-US"/>
           </a:p>
@@ -5382,7 +5382,7 @@
           <a:p>
             <a:fld id="{AE374B5B-21A0-4192-BF4C-38187F1A68D8}" type="datetime1">
               <a:rPr lang="en-US" smtClean="0"/>
-              <a:t>3/9/2015</a:t>
+              <a:t>3/10/2015</a:t>
             </a:fld>
             <a:endParaRPr lang="en-US"/>
           </a:p>
@@ -5573,7 +5573,7 @@
           <a:p>
             <a:fld id="{AE374B5B-21A0-4192-BF4C-38187F1A68D8}" type="datetime1">
               <a:rPr lang="en-US" smtClean="0"/>
-              <a:t>3/9/2015</a:t>
+              <a:t>3/10/2015</a:t>
             </a:fld>
             <a:endParaRPr lang="en-US"/>
           </a:p>
@@ -7871,7 +7871,7 @@
           <a:p>
             <a:fld id="{33B5CF7C-B333-48E1-A4A6-83A3C8B73AC0}" type="datetime1">
               <a:rPr lang="en-US" smtClean="0"/>
-              <a:t>3/9/2015</a:t>
+              <a:t>3/10/2015</a:t>
             </a:fld>
             <a:endParaRPr lang="en-US"/>
           </a:p>
@@ -8326,7 +8326,7 @@
           <a:p>
             <a:fld id="{AE320762-5CBF-4210-AB54-376B091119F8}" type="datetime1">
               <a:rPr lang="en-US" smtClean="0"/>
-              <a:t>3/9/2015</a:t>
+              <a:t>3/10/2015</a:t>
             </a:fld>
             <a:endParaRPr lang="en-US"/>
           </a:p>
@@ -8459,7 +8459,7 @@
           <a:p>
             <a:fld id="{7F0DB371-BF5F-4058-A212-1A908E4D2674}" type="datetime1">
               <a:rPr lang="en-US" smtClean="0"/>
-              <a:t>3/9/2015</a:t>
+              <a:t>3/10/2015</a:t>
             </a:fld>
             <a:endParaRPr lang="en-US"/>
           </a:p>
@@ -10392,7 +10392,7 @@
           <a:p>
             <a:fld id="{60A4083B-90AA-48CF-BAD5-00AA24D7F288}" type="datetime1">
               <a:rPr lang="en-US" smtClean="0"/>
-              <a:t>3/9/2015</a:t>
+              <a:t>3/10/2015</a:t>
             </a:fld>
             <a:endParaRPr lang="en-US"/>
           </a:p>
@@ -14647,7 +14647,7 @@
           <a:p>
             <a:fld id="{B51B2453-8663-4C69-AF73-9FD7B1DEC5D0}" type="datetime1">
               <a:rPr lang="en-US" smtClean="0"/>
-              <a:t>3/9/2015</a:t>
+              <a:t>3/10/2015</a:t>
             </a:fld>
             <a:endParaRPr lang="en-US"/>
           </a:p>
@@ -15285,7 +15285,11 @@
           <a:p>
             <a:r>
               <a:rPr lang="en-US" dirty="0" smtClean="0"/>
-              <a:t>Exercise: Hello World</a:t>
+              <a:t>Exercise: </a:t>
+            </a:r>
+            <a:r>
+              <a:rPr lang="en-US" dirty="0" err="1" smtClean="0"/>
+              <a:t>HelloWorld</a:t>
             </a:r>
             <a:endParaRPr lang="en-US" dirty="0"/>
           </a:p>
@@ -16558,7 +16562,11 @@
           <a:p>
             <a:r>
               <a:rPr lang="en-US" dirty="0" smtClean="0"/>
-              <a:t>Exercise: Hello World</a:t>
+              <a:t>Exercise: </a:t>
+            </a:r>
+            <a:r>
+              <a:rPr lang="en-US" dirty="0" err="1" smtClean="0"/>
+              <a:t>HelloWorld</a:t>
             </a:r>
             <a:endParaRPr lang="en-US" sz="1800" dirty="0"/>
           </a:p>

</xml_diff>